<commit_message>
add more design info, user survey info
</commit_message>
<xml_diff>
--- a/cs-545-presentation.pptx
+++ b/cs-545-presentation.pptx
@@ -15,7 +15,7 @@
     <p:sldId id="266" r:id="rId6"/>
     <p:sldId id="258" r:id="rId7"/>
     <p:sldId id="269" r:id="rId8"/>
-    <p:sldId id="272" r:id="rId9"/>
+    <p:sldId id="274" r:id="rId9"/>
     <p:sldId id="273" r:id="rId10"/>
     <p:sldId id="262" r:id="rId11"/>
     <p:sldId id="270" r:id="rId12"/>
@@ -117,6 +117,22 @@
       </a:defRPr>
     </a:lvl9pPr>
   </p:defaultTextStyle>
+  <p:extLst>
+    <p:ext uri="{EFAFB233-063F-42B5-8137-9DF3F51BA10A}">
+      <p15:sldGuideLst xmlns:p15="http://schemas.microsoft.com/office/powerpoint/2012/main" xmlns="">
+        <p15:guide id="1" orient="horz" pos="2160">
+          <p15:clr>
+            <a:srgbClr val="A4A3A4"/>
+          </p15:clr>
+        </p15:guide>
+        <p15:guide id="2" pos="2880">
+          <p15:clr>
+            <a:srgbClr val="A4A3A4"/>
+          </p15:clr>
+        </p15:guide>
+      </p15:sldGuideLst>
+    </p:ext>
+  </p:extLst>
 </p:presentation>
 </file>
 
@@ -169,7 +185,7 @@
             </a:lvl1pPr>
           </a:lstStyle>
           <a:p>
-            <a:endParaRPr lang="en-US"/>
+            <a:endParaRPr lang="en-US" dirty="0"/>
           </a:p>
         </p:txBody>
       </p:sp>
@@ -204,7 +220,7 @@
               <a:rPr lang="en-US" smtClean="0"/>
               <a:t>4/14/2013</a:t>
             </a:fld>
-            <a:endParaRPr lang="en-US"/>
+            <a:endParaRPr lang="en-US" dirty="0"/>
           </a:p>
         </p:txBody>
       </p:sp>
@@ -237,7 +253,7 @@
           <a:bodyPr vert="horz" lIns="91440" tIns="45720" rIns="91440" bIns="45720" rtlCol="0" anchor="ctr"/>
           <a:lstStyle/>
           <a:p>
-            <a:endParaRPr lang="en-US"/>
+            <a:endParaRPr lang="en-US" dirty="0"/>
           </a:p>
         </p:txBody>
       </p:sp>
@@ -328,7 +344,7 @@
             </a:lvl1pPr>
           </a:lstStyle>
           <a:p>
-            <a:endParaRPr lang="en-US"/>
+            <a:endParaRPr lang="en-US" dirty="0"/>
           </a:p>
         </p:txBody>
       </p:sp>
@@ -363,7 +379,7 @@
               <a:rPr lang="en-US" smtClean="0"/>
               <a:t>‹#›</a:t>
             </a:fld>
-            <a:endParaRPr lang="en-US"/>
+            <a:endParaRPr lang="en-US" dirty="0"/>
           </a:p>
         </p:txBody>
       </p:sp>
@@ -574,7 +590,7 @@
               <a:rPr lang="en-US" smtClean="0"/>
               <a:t>3</a:t>
             </a:fld>
-            <a:endParaRPr lang="en-US"/>
+            <a:endParaRPr lang="en-US" dirty="0"/>
           </a:p>
         </p:txBody>
       </p:sp>
@@ -635,11 +651,94 @@
           <a:bodyPr/>
           <a:lstStyle/>
           <a:p>
+            <a:endParaRPr lang="en-US" dirty="0"/>
+          </a:p>
+        </p:txBody>
+      </p:sp>
+      <p:sp>
+        <p:nvSpPr>
+          <p:cNvPr id="4" name="Slide Number Placeholder 3"/>
+          <p:cNvSpPr>
+            <a:spLocks noGrp="1"/>
+          </p:cNvSpPr>
+          <p:nvPr>
+            <p:ph type="sldNum" sz="quarter" idx="10"/>
+          </p:nvPr>
+        </p:nvSpPr>
+        <p:spPr/>
+        <p:txBody>
+          <a:bodyPr/>
+          <a:lstStyle/>
+          <a:p>
+            <a:fld id="{23A87F7C-8401-485A-BB32-D2822C8B0F75}" type="slidenum">
+              <a:rPr lang="en-US" smtClean="0"/>
+              <a:t>5</a:t>
+            </a:fld>
+            <a:endParaRPr lang="en-US" dirty="0"/>
+          </a:p>
+        </p:txBody>
+      </p:sp>
+    </p:spTree>
+    <p:extLst>
+      <p:ext uri="{BB962C8B-B14F-4D97-AF65-F5344CB8AC3E}">
+        <p14:creationId xmlns:p14="http://schemas.microsoft.com/office/powerpoint/2010/main" val="3614051550"/>
+      </p:ext>
+    </p:extLst>
+  </p:cSld>
+  <p:clrMapOvr>
+    <a:masterClrMapping/>
+  </p:clrMapOvr>
+</p:notes>
+</file>
+
+<file path=ppt/notesSlides/notesSlide3.xml><?xml version="1.0" encoding="utf-8"?>
+<p:notes xmlns:a="http://schemas.openxmlformats.org/drawingml/2006/main" xmlns:r="http://schemas.openxmlformats.org/officeDocument/2006/relationships" xmlns:p="http://schemas.openxmlformats.org/presentationml/2006/main">
+  <p:cSld>
+    <p:spTree>
+      <p:nvGrpSpPr>
+        <p:cNvPr id="1" name=""/>
+        <p:cNvGrpSpPr/>
+        <p:nvPr/>
+      </p:nvGrpSpPr>
+      <p:grpSpPr>
+        <a:xfrm>
+          <a:off x="0" y="0"/>
+          <a:ext cx="0" cy="0"/>
+          <a:chOff x="0" y="0"/>
+          <a:chExt cx="0" cy="0"/>
+        </a:xfrm>
+      </p:grpSpPr>
+      <p:sp>
+        <p:nvSpPr>
+          <p:cNvPr id="2" name="Slide Image Placeholder 1"/>
+          <p:cNvSpPr>
+            <a:spLocks noGrp="1" noRot="1" noChangeAspect="1"/>
+          </p:cNvSpPr>
+          <p:nvPr>
+            <p:ph type="sldImg"/>
+          </p:nvPr>
+        </p:nvSpPr>
+        <p:spPr/>
+      </p:sp>
+      <p:sp>
+        <p:nvSpPr>
+          <p:cNvPr id="3" name="Notes Placeholder 2"/>
+          <p:cNvSpPr>
+            <a:spLocks noGrp="1"/>
+          </p:cNvSpPr>
+          <p:nvPr>
+            <p:ph type="body" idx="1"/>
+          </p:nvPr>
+        </p:nvSpPr>
+        <p:spPr/>
+        <p:txBody>
+          <a:bodyPr/>
+          <a:lstStyle/>
+          <a:p>
             <a:r>
               <a:rPr lang="en-US" baseline="0" dirty="0" smtClean="0"/>
               <a:t>Initially, each member of the group created a paper prototype. Then we each demoed them to each other in a Google+ Hangout. We then discussed and used pieces of all of our paper prototypes for the final design. We then spent a few weeks actually designing our initial prototype for the web.</a:t>
             </a:r>
-            <a:endParaRPr lang="en-US" dirty="0"/>
           </a:p>
         </p:txBody>
       </p:sp>
@@ -662,7 +761,7 @@
               <a:rPr lang="en-US" smtClean="0"/>
               <a:t>6</a:t>
             </a:fld>
-            <a:endParaRPr lang="en-US"/>
+            <a:endParaRPr lang="en-US" dirty="0"/>
           </a:p>
         </p:txBody>
       </p:sp>
@@ -670,6 +769,906 @@
     <p:extLst>
       <p:ext uri="{BB962C8B-B14F-4D97-AF65-F5344CB8AC3E}">
         <p14:creationId xmlns:p14="http://schemas.microsoft.com/office/powerpoint/2010/main" val="1450516455"/>
+      </p:ext>
+    </p:extLst>
+  </p:cSld>
+  <p:clrMapOvr>
+    <a:masterClrMapping/>
+  </p:clrMapOvr>
+</p:notes>
+</file>
+
+<file path=ppt/notesSlides/notesSlide4.xml><?xml version="1.0" encoding="utf-8"?>
+<p:notes xmlns:a="http://schemas.openxmlformats.org/drawingml/2006/main" xmlns:r="http://schemas.openxmlformats.org/officeDocument/2006/relationships" xmlns:p="http://schemas.openxmlformats.org/presentationml/2006/main">
+  <p:cSld>
+    <p:spTree>
+      <p:nvGrpSpPr>
+        <p:cNvPr id="1" name=""/>
+        <p:cNvGrpSpPr/>
+        <p:nvPr/>
+      </p:nvGrpSpPr>
+      <p:grpSpPr>
+        <a:xfrm>
+          <a:off x="0" y="0"/>
+          <a:ext cx="0" cy="0"/>
+          <a:chOff x="0" y="0"/>
+          <a:chExt cx="0" cy="0"/>
+        </a:xfrm>
+      </p:grpSpPr>
+      <p:sp>
+        <p:nvSpPr>
+          <p:cNvPr id="2" name="Slide Image Placeholder 1"/>
+          <p:cNvSpPr>
+            <a:spLocks noGrp="1" noRot="1" noChangeAspect="1"/>
+          </p:cNvSpPr>
+          <p:nvPr>
+            <p:ph type="sldImg"/>
+          </p:nvPr>
+        </p:nvSpPr>
+        <p:spPr/>
+      </p:sp>
+      <p:sp>
+        <p:nvSpPr>
+          <p:cNvPr id="3" name="Notes Placeholder 2"/>
+          <p:cNvSpPr>
+            <a:spLocks noGrp="1"/>
+          </p:cNvSpPr>
+          <p:nvPr>
+            <p:ph type="body" idx="1"/>
+          </p:nvPr>
+        </p:nvSpPr>
+        <p:spPr/>
+        <p:txBody>
+          <a:bodyPr/>
+          <a:lstStyle/>
+          <a:p>
+            <a:pPr fontAlgn="auto">
+              <a:spcBef>
+                <a:spcPts val="0"/>
+              </a:spcBef>
+              <a:spcAft>
+                <a:spcPts val="0"/>
+              </a:spcAft>
+              <a:defRPr/>
+            </a:pPr>
+            <a:r>
+              <a:rPr lang="en-US" sz="2400" b="1" dirty="0" smtClean="0">
+                <a:solidFill>
+                  <a:srgbClr val="0070C0"/>
+                </a:solidFill>
+              </a:rPr>
+              <a:t>1. Primary: </a:t>
+            </a:r>
+            <a:r>
+              <a:rPr lang="en-US" sz="2400" b="1" i="1" dirty="0" smtClean="0">
+                <a:solidFill>
+                  <a:srgbClr val="0070C0"/>
+                </a:solidFill>
+              </a:rPr>
+              <a:t>Error tolerant</a:t>
+            </a:r>
+          </a:p>
+          <a:p>
+            <a:pPr lvl="1" fontAlgn="auto">
+              <a:spcBef>
+                <a:spcPts val="0"/>
+              </a:spcBef>
+              <a:spcAft>
+                <a:spcPts val="0"/>
+              </a:spcAft>
+              <a:defRPr/>
+            </a:pPr>
+            <a:r>
+              <a:rPr lang="en-US" sz="2400" u="sng" dirty="0" smtClean="0"/>
+              <a:t>Error category:  </a:t>
+            </a:r>
+          </a:p>
+          <a:p>
+            <a:pPr marL="1371600" lvl="2" indent="-457200" fontAlgn="auto">
+              <a:lnSpc>
+                <a:spcPct val="150000"/>
+              </a:lnSpc>
+              <a:spcBef>
+                <a:spcPts val="0"/>
+              </a:spcBef>
+              <a:spcAft>
+                <a:spcPts val="0"/>
+              </a:spcAft>
+              <a:buFont typeface="+mj-lt"/>
+              <a:buAutoNum type="arabicPeriod"/>
+              <a:defRPr/>
+            </a:pPr>
+            <a:r>
+              <a:rPr lang="en-US" sz="2000" dirty="0" smtClean="0"/>
+              <a:t>Invalid inputs</a:t>
+            </a:r>
+          </a:p>
+          <a:p>
+            <a:pPr marL="1371600" lvl="2" indent="-457200" fontAlgn="auto">
+              <a:lnSpc>
+                <a:spcPct val="150000"/>
+              </a:lnSpc>
+              <a:spcBef>
+                <a:spcPts val="0"/>
+              </a:spcBef>
+              <a:spcAft>
+                <a:spcPts val="0"/>
+              </a:spcAft>
+              <a:buFont typeface="+mj-lt"/>
+              <a:buAutoNum type="arabicPeriod"/>
+              <a:defRPr/>
+            </a:pPr>
+            <a:r>
+              <a:rPr lang="en-US" sz="2000" dirty="0" smtClean="0"/>
+              <a:t>Required inputs missing</a:t>
+            </a:r>
+          </a:p>
+          <a:p>
+            <a:pPr marL="1371600" lvl="2" indent="-457200" fontAlgn="auto">
+              <a:lnSpc>
+                <a:spcPct val="150000"/>
+              </a:lnSpc>
+              <a:spcBef>
+                <a:spcPts val="0"/>
+              </a:spcBef>
+              <a:spcAft>
+                <a:spcPts val="0"/>
+              </a:spcAft>
+              <a:buFont typeface="+mj-lt"/>
+              <a:buAutoNum type="arabicPeriod"/>
+              <a:defRPr/>
+            </a:pPr>
+            <a:r>
+              <a:rPr lang="en-US" sz="2000" dirty="0" smtClean="0"/>
+              <a:t>Error in a section not corrected after clicking  ‘CONTINUE’ button  </a:t>
+            </a:r>
+          </a:p>
+          <a:p>
+            <a:pPr marL="1371600" lvl="2" indent="-457200" fontAlgn="auto">
+              <a:lnSpc>
+                <a:spcPct val="150000"/>
+              </a:lnSpc>
+              <a:spcBef>
+                <a:spcPts val="0"/>
+              </a:spcBef>
+              <a:spcAft>
+                <a:spcPts val="0"/>
+              </a:spcAft>
+              <a:buFont typeface="+mj-lt"/>
+              <a:buAutoNum type="arabicPeriod"/>
+              <a:defRPr/>
+            </a:pPr>
+            <a:r>
+              <a:rPr lang="en-US" sz="2000" dirty="0" smtClean="0"/>
+              <a:t>Hidden errors that have passed validation but the customer is aware of during the ‘CONFIRM ORDER’ section</a:t>
+            </a:r>
+          </a:p>
+          <a:p>
+            <a:pPr marL="1371600" lvl="2" indent="-457200" fontAlgn="auto">
+              <a:lnSpc>
+                <a:spcPct val="150000"/>
+              </a:lnSpc>
+              <a:spcBef>
+                <a:spcPts val="0"/>
+              </a:spcBef>
+              <a:spcAft>
+                <a:spcPts val="0"/>
+              </a:spcAft>
+              <a:buFont typeface="+mj-lt"/>
+              <a:buAutoNum type="arabicPeriod"/>
+              <a:defRPr/>
+            </a:pPr>
+            <a:r>
+              <a:rPr lang="en-US" sz="2000" dirty="0" smtClean="0"/>
+              <a:t>Shipping option selection</a:t>
+            </a:r>
+          </a:p>
+          <a:p>
+            <a:pPr lvl="1" fontAlgn="auto">
+              <a:spcBef>
+                <a:spcPts val="0"/>
+              </a:spcBef>
+              <a:spcAft>
+                <a:spcPts val="0"/>
+              </a:spcAft>
+              <a:defRPr/>
+            </a:pPr>
+            <a:r>
+              <a:rPr lang="en-US" sz="2400" dirty="0" smtClean="0">
+                <a:solidFill>
+                  <a:srgbClr val="0070C0"/>
+                </a:solidFill>
+              </a:rPr>
+              <a:t> </a:t>
+            </a:r>
+            <a:r>
+              <a:rPr lang="en-US" sz="2400" u="sng" dirty="0" smtClean="0"/>
+              <a:t>Design method: </a:t>
+            </a:r>
+          </a:p>
+          <a:p>
+            <a:pPr marL="1257300" lvl="2" indent="-342900" fontAlgn="auto">
+              <a:lnSpc>
+                <a:spcPct val="150000"/>
+              </a:lnSpc>
+              <a:spcBef>
+                <a:spcPts val="0"/>
+              </a:spcBef>
+              <a:spcAft>
+                <a:spcPts val="0"/>
+              </a:spcAft>
+              <a:buFont typeface="Arial" pitchFamily="34" charset="0"/>
+              <a:buChar char="•"/>
+              <a:defRPr/>
+            </a:pPr>
+            <a:r>
+              <a:rPr lang="en-US" sz="2000" dirty="0" smtClean="0"/>
+              <a:t>Use extensive </a:t>
+            </a:r>
+            <a:r>
+              <a:rPr lang="en-US" sz="2000" i="1" dirty="0" smtClean="0">
+                <a:solidFill>
+                  <a:srgbClr val="00B050"/>
+                </a:solidFill>
+              </a:rPr>
+              <a:t>validations</a:t>
+            </a:r>
+            <a:r>
+              <a:rPr lang="en-US" sz="2000" dirty="0" smtClean="0"/>
+              <a:t> throughout the website for customer inputs. </a:t>
+            </a:r>
+          </a:p>
+          <a:p>
+            <a:pPr marL="1257300" lvl="2" indent="-342900" fontAlgn="auto">
+              <a:lnSpc>
+                <a:spcPct val="150000"/>
+              </a:lnSpc>
+              <a:spcBef>
+                <a:spcPts val="0"/>
+              </a:spcBef>
+              <a:spcAft>
+                <a:spcPts val="0"/>
+              </a:spcAft>
+              <a:buFont typeface="Arial" pitchFamily="34" charset="0"/>
+              <a:buChar char="•"/>
+              <a:defRPr/>
+            </a:pPr>
+            <a:r>
+              <a:rPr lang="en-US" sz="2000" dirty="0" smtClean="0"/>
+              <a:t>Allow the customer to </a:t>
+            </a:r>
+            <a:r>
+              <a:rPr lang="en-US" sz="2000" i="1" dirty="0" smtClean="0">
+                <a:solidFill>
+                  <a:srgbClr val="00B050"/>
+                </a:solidFill>
+              </a:rPr>
+              <a:t>edit inputs </a:t>
+            </a:r>
+            <a:r>
+              <a:rPr lang="en-US" sz="2000" dirty="0" smtClean="0"/>
+              <a:t>before clicking ‘PURCHASE’ button.</a:t>
+            </a:r>
+          </a:p>
+          <a:p>
+            <a:pPr marL="1257300" lvl="2" indent="-342900" fontAlgn="auto">
+              <a:lnSpc>
+                <a:spcPct val="150000"/>
+              </a:lnSpc>
+              <a:spcBef>
+                <a:spcPts val="0"/>
+              </a:spcBef>
+              <a:spcAft>
+                <a:spcPts val="0"/>
+              </a:spcAft>
+              <a:buFont typeface="Arial" pitchFamily="34" charset="0"/>
+              <a:buChar char="•"/>
+              <a:defRPr/>
+            </a:pPr>
+            <a:r>
+              <a:rPr lang="en-US" sz="2000" dirty="0" smtClean="0"/>
+              <a:t>Always-on ‘CART’ panel to </a:t>
+            </a:r>
+            <a:r>
+              <a:rPr lang="en-US" sz="2000" i="1" dirty="0" smtClean="0">
+                <a:solidFill>
+                  <a:srgbClr val="00B050"/>
+                </a:solidFill>
+              </a:rPr>
+              <a:t>remind</a:t>
+            </a:r>
+            <a:r>
+              <a:rPr lang="en-US" sz="2000" dirty="0" smtClean="0"/>
+              <a:t> the customer of his or her shipping cost.</a:t>
+            </a:r>
+          </a:p>
+          <a:p>
+            <a:pPr marL="800100" lvl="1" indent="-342900" fontAlgn="auto">
+              <a:lnSpc>
+                <a:spcPct val="150000"/>
+              </a:lnSpc>
+              <a:spcBef>
+                <a:spcPts val="0"/>
+              </a:spcBef>
+              <a:spcAft>
+                <a:spcPts val="0"/>
+              </a:spcAft>
+              <a:buFont typeface="Arial" pitchFamily="34" charset="0"/>
+              <a:buChar char="•"/>
+              <a:defRPr/>
+            </a:pPr>
+            <a:endParaRPr lang="en-US" sz="2000" dirty="0" smtClean="0"/>
+          </a:p>
+          <a:p>
+            <a:pPr fontAlgn="auto">
+              <a:spcBef>
+                <a:spcPts val="0"/>
+              </a:spcBef>
+              <a:spcAft>
+                <a:spcPts val="0"/>
+              </a:spcAft>
+              <a:defRPr/>
+            </a:pPr>
+            <a:r>
+              <a:rPr lang="en-US" sz="2400" b="1" dirty="0" smtClean="0">
+                <a:solidFill>
+                  <a:srgbClr val="0070C0"/>
+                </a:solidFill>
+              </a:rPr>
+              <a:t>2. Secondary: </a:t>
+            </a:r>
+            <a:r>
+              <a:rPr lang="en-US" sz="2400" b="1" i="1" dirty="0" smtClean="0">
+                <a:solidFill>
+                  <a:srgbClr val="0070C0"/>
+                </a:solidFill>
+              </a:rPr>
+              <a:t>efficient</a:t>
+            </a:r>
+            <a:r>
+              <a:rPr lang="en-US" sz="2400" b="1" dirty="0" smtClean="0">
+                <a:solidFill>
+                  <a:srgbClr val="0070C0"/>
+                </a:solidFill>
+              </a:rPr>
+              <a:t>. </a:t>
+            </a:r>
+          </a:p>
+          <a:p>
+            <a:pPr marL="800100" lvl="1" indent="-342900" fontAlgn="auto">
+              <a:spcBef>
+                <a:spcPts val="0"/>
+              </a:spcBef>
+              <a:spcAft>
+                <a:spcPts val="0"/>
+              </a:spcAft>
+              <a:buFont typeface="Arial" pitchFamily="34" charset="0"/>
+              <a:buChar char="•"/>
+              <a:defRPr/>
+            </a:pPr>
+            <a:r>
+              <a:rPr lang="en-US" sz="2000" dirty="0" smtClean="0"/>
+              <a:t>Efforts on error tolerance during a checkout process lead to a more efficient process in the following ways</a:t>
+            </a:r>
+            <a:endParaRPr lang="en-US" dirty="0" smtClean="0"/>
+          </a:p>
+          <a:p>
+            <a:pPr marL="1257300" lvl="2" indent="-342900" fontAlgn="auto">
+              <a:spcBef>
+                <a:spcPts val="0"/>
+              </a:spcBef>
+              <a:spcAft>
+                <a:spcPts val="0"/>
+              </a:spcAft>
+              <a:buFont typeface="Arial" pitchFamily="34" charset="0"/>
+              <a:buChar char="•"/>
+              <a:defRPr/>
+            </a:pPr>
+            <a:r>
+              <a:rPr lang="en-US" dirty="0" smtClean="0"/>
+              <a:t>Transition from one section to another is coupled with validation to speed up error correction</a:t>
+            </a:r>
+          </a:p>
+          <a:p>
+            <a:pPr marL="1257300" lvl="2" indent="-342900" fontAlgn="auto">
+              <a:spcBef>
+                <a:spcPts val="0"/>
+              </a:spcBef>
+              <a:spcAft>
+                <a:spcPts val="0"/>
+              </a:spcAft>
+              <a:buFont typeface="Arial" pitchFamily="34" charset="0"/>
+              <a:buChar char="•"/>
+              <a:defRPr/>
+            </a:pPr>
+            <a:r>
+              <a:rPr lang="en-US" dirty="0" smtClean="0"/>
+              <a:t>Instant validation messages help the user correct errors in an efficient way</a:t>
+            </a:r>
+          </a:p>
+          <a:p>
+            <a:pPr marL="1257300" lvl="2" indent="-342900" fontAlgn="auto">
+              <a:spcBef>
+                <a:spcPts val="0"/>
+              </a:spcBef>
+              <a:spcAft>
+                <a:spcPts val="0"/>
+              </a:spcAft>
+              <a:buFont typeface="Arial" pitchFamily="34" charset="0"/>
+              <a:buChar char="•"/>
+              <a:defRPr/>
+            </a:pPr>
+            <a:r>
+              <a:rPr lang="en-US" dirty="0" smtClean="0"/>
+              <a:t>Edit function in the ‘CONFIRMATION’ section offers the user a way to quickly jump to the section to correct any hidden errors that have passed validation</a:t>
+            </a:r>
+            <a:endParaRPr lang="en-US" dirty="0" smtClean="0">
+              <a:solidFill>
+                <a:srgbClr val="0070C0"/>
+              </a:solidFill>
+            </a:endParaRPr>
+          </a:p>
+          <a:p>
+            <a:pPr marL="800100" lvl="1" indent="-342900" fontAlgn="auto">
+              <a:spcBef>
+                <a:spcPts val="0"/>
+              </a:spcBef>
+              <a:spcAft>
+                <a:spcPts val="0"/>
+              </a:spcAft>
+              <a:buFont typeface="Arial" pitchFamily="34" charset="0"/>
+              <a:buChar char="•"/>
+              <a:defRPr/>
+            </a:pPr>
+            <a:r>
+              <a:rPr lang="en-US" sz="2000" dirty="0" smtClean="0"/>
+              <a:t>Other design methods to improve efficiency </a:t>
+            </a:r>
+            <a:endParaRPr lang="en-US" dirty="0" smtClean="0"/>
+          </a:p>
+          <a:p>
+            <a:pPr marL="1200150" lvl="2" indent="-285750" fontAlgn="auto">
+              <a:spcBef>
+                <a:spcPts val="0"/>
+              </a:spcBef>
+              <a:spcAft>
+                <a:spcPts val="0"/>
+              </a:spcAft>
+              <a:buFont typeface="Arial" pitchFamily="34" charset="0"/>
+              <a:buChar char="•"/>
+              <a:defRPr/>
+            </a:pPr>
+            <a:r>
+              <a:rPr lang="en-US" dirty="0" smtClean="0"/>
+              <a:t>Sectioned design help the user to navigate directly through ‘BACK/CONTINUE’ button in the same page (no page refreshing)</a:t>
+            </a:r>
+          </a:p>
+          <a:p>
+            <a:pPr marL="1200150" lvl="2" indent="-285750" fontAlgn="auto">
+              <a:spcBef>
+                <a:spcPts val="0"/>
+              </a:spcBef>
+              <a:spcAft>
+                <a:spcPts val="0"/>
+              </a:spcAft>
+              <a:buFont typeface="Arial" pitchFamily="34" charset="0"/>
+              <a:buChar char="•"/>
+              <a:defRPr/>
+            </a:pPr>
+            <a:r>
+              <a:rPr lang="en-US" dirty="0" smtClean="0"/>
+              <a:t>Always-on ‘CART’ panel reminds  the user of his/her order details including quantity, item cost, shipping cost and total charge.</a:t>
+            </a:r>
+          </a:p>
+          <a:p>
+            <a:pPr marL="1200150" lvl="2" indent="-285750" fontAlgn="auto">
+              <a:spcBef>
+                <a:spcPts val="0"/>
+              </a:spcBef>
+              <a:spcAft>
+                <a:spcPts val="0"/>
+              </a:spcAft>
+              <a:buFont typeface="Arial" pitchFamily="34" charset="0"/>
+              <a:buChar char="•"/>
+              <a:defRPr/>
+            </a:pPr>
+            <a:r>
+              <a:rPr lang="en-US" dirty="0" smtClean="0"/>
+              <a:t>Dynamic process flow panel help the customer understand the process and also visualize the stage of his/her checkout process</a:t>
+            </a:r>
+          </a:p>
+          <a:p>
+            <a:endParaRPr lang="en-US" dirty="0"/>
+          </a:p>
+        </p:txBody>
+      </p:sp>
+      <p:sp>
+        <p:nvSpPr>
+          <p:cNvPr id="4" name="Slide Number Placeholder 3"/>
+          <p:cNvSpPr>
+            <a:spLocks noGrp="1"/>
+          </p:cNvSpPr>
+          <p:nvPr>
+            <p:ph type="sldNum" sz="quarter" idx="10"/>
+          </p:nvPr>
+        </p:nvSpPr>
+        <p:spPr/>
+        <p:txBody>
+          <a:bodyPr/>
+          <a:lstStyle/>
+          <a:p>
+            <a:fld id="{23A87F7C-8401-485A-BB32-D2822C8B0F75}" type="slidenum">
+              <a:rPr lang="en-US" smtClean="0"/>
+              <a:t>7</a:t>
+            </a:fld>
+            <a:endParaRPr lang="en-US" dirty="0"/>
+          </a:p>
+        </p:txBody>
+      </p:sp>
+    </p:spTree>
+    <p:extLst>
+      <p:ext uri="{BB962C8B-B14F-4D97-AF65-F5344CB8AC3E}">
+        <p14:creationId xmlns:p14="http://schemas.microsoft.com/office/powerpoint/2010/main" val="1823963383"/>
+      </p:ext>
+    </p:extLst>
+  </p:cSld>
+  <p:clrMapOvr>
+    <a:masterClrMapping/>
+  </p:clrMapOvr>
+</p:notes>
+</file>
+
+<file path=ppt/notesSlides/notesSlide5.xml><?xml version="1.0" encoding="utf-8"?>
+<p:notes xmlns:a="http://schemas.openxmlformats.org/drawingml/2006/main" xmlns:r="http://schemas.openxmlformats.org/officeDocument/2006/relationships" xmlns:p="http://schemas.openxmlformats.org/presentationml/2006/main">
+  <p:cSld>
+    <p:spTree>
+      <p:nvGrpSpPr>
+        <p:cNvPr id="1" name=""/>
+        <p:cNvGrpSpPr/>
+        <p:nvPr/>
+      </p:nvGrpSpPr>
+      <p:grpSpPr>
+        <a:xfrm>
+          <a:off x="0" y="0"/>
+          <a:ext cx="0" cy="0"/>
+          <a:chOff x="0" y="0"/>
+          <a:chExt cx="0" cy="0"/>
+        </a:xfrm>
+      </p:grpSpPr>
+      <p:sp>
+        <p:nvSpPr>
+          <p:cNvPr id="2" name="Slide Image Placeholder 1"/>
+          <p:cNvSpPr>
+            <a:spLocks noGrp="1" noRot="1" noChangeAspect="1"/>
+          </p:cNvSpPr>
+          <p:nvPr>
+            <p:ph type="sldImg"/>
+          </p:nvPr>
+        </p:nvSpPr>
+        <p:spPr/>
+      </p:sp>
+      <p:sp>
+        <p:nvSpPr>
+          <p:cNvPr id="3" name="Notes Placeholder 2"/>
+          <p:cNvSpPr>
+            <a:spLocks noGrp="1"/>
+          </p:cNvSpPr>
+          <p:nvPr>
+            <p:ph type="body" idx="1"/>
+          </p:nvPr>
+        </p:nvSpPr>
+        <p:spPr/>
+        <p:txBody>
+          <a:bodyPr/>
+          <a:lstStyle/>
+          <a:p>
+            <a:r>
+              <a:rPr lang="en-US" sz="1200" kern="1200" dirty="0" smtClean="0">
+                <a:solidFill>
+                  <a:schemeClr val="tx1"/>
+                </a:solidFill>
+                <a:effectLst/>
+                <a:latin typeface="+mn-lt"/>
+                <a:ea typeface="+mn-ea"/>
+                <a:cs typeface="+mn-cs"/>
+              </a:rPr>
+              <a:t>SURVEY DATA-</a:t>
+            </a:r>
+            <a:endParaRPr lang="en-IN" sz="1200" kern="1200" dirty="0" smtClean="0">
+              <a:solidFill>
+                <a:schemeClr val="tx1"/>
+              </a:solidFill>
+              <a:effectLst/>
+              <a:latin typeface="+mn-lt"/>
+              <a:ea typeface="+mn-ea"/>
+              <a:cs typeface="+mn-cs"/>
+            </a:endParaRPr>
+          </a:p>
+          <a:p>
+            <a:r>
+              <a:rPr lang="en-IN" sz="1200" kern="1200" dirty="0" smtClean="0">
+                <a:solidFill>
+                  <a:schemeClr val="tx1"/>
+                </a:solidFill>
+                <a:effectLst/>
+                <a:latin typeface="+mn-lt"/>
+                <a:ea typeface="+mn-ea"/>
+                <a:cs typeface="+mn-cs"/>
+              </a:rPr>
+              <a:t>1-Have you ever experienced frustration with the checkout process when shopping online?</a:t>
+            </a:r>
+          </a:p>
+          <a:p>
+            <a:r>
+              <a:rPr lang="en-IN" sz="1200" kern="1200" dirty="0" smtClean="0">
+                <a:solidFill>
+                  <a:schemeClr val="tx1"/>
+                </a:solidFill>
+                <a:effectLst/>
+                <a:latin typeface="+mn-lt"/>
+                <a:ea typeface="+mn-ea"/>
+                <a:cs typeface="+mn-cs"/>
+              </a:rPr>
+              <a:t>YES-30%           NO-70%</a:t>
+            </a:r>
+          </a:p>
+          <a:p>
+            <a:r>
+              <a:rPr lang="en-IN" sz="1200" kern="1200" dirty="0" smtClean="0">
+                <a:solidFill>
+                  <a:schemeClr val="tx1"/>
+                </a:solidFill>
+                <a:effectLst/>
+                <a:latin typeface="+mn-lt"/>
+                <a:ea typeface="+mn-ea"/>
+                <a:cs typeface="+mn-cs"/>
+              </a:rPr>
+              <a:t>2- Have you ever abandoned an online purchase due to difficulty at checkout?</a:t>
+            </a:r>
+          </a:p>
+          <a:p>
+            <a:r>
+              <a:rPr lang="en-IN" sz="1200" kern="1200" dirty="0" smtClean="0">
+                <a:solidFill>
+                  <a:schemeClr val="tx1"/>
+                </a:solidFill>
+                <a:effectLst/>
+                <a:latin typeface="+mn-lt"/>
+                <a:ea typeface="+mn-ea"/>
+                <a:cs typeface="+mn-cs"/>
+              </a:rPr>
+              <a:t>YES-69%          NO-31%</a:t>
+            </a:r>
+          </a:p>
+          <a:p>
+            <a:r>
+              <a:rPr lang="en-IN" sz="1200" kern="1200" dirty="0" smtClean="0">
+                <a:solidFill>
+                  <a:schemeClr val="tx1"/>
+                </a:solidFill>
+                <a:effectLst/>
+                <a:latin typeface="+mn-lt"/>
+                <a:ea typeface="+mn-ea"/>
+                <a:cs typeface="+mn-cs"/>
+              </a:rPr>
+              <a:t>3-Do you prefer sites that don't force you to register an account (create a username and Password) when you go through checkout?</a:t>
+            </a:r>
+          </a:p>
+          <a:p>
+            <a:r>
+              <a:rPr lang="en-IN" sz="1200" kern="1200" dirty="0" smtClean="0">
+                <a:solidFill>
+                  <a:schemeClr val="tx1"/>
+                </a:solidFill>
+                <a:effectLst/>
+                <a:latin typeface="+mn-lt"/>
+                <a:ea typeface="+mn-ea"/>
+                <a:cs typeface="+mn-cs"/>
+              </a:rPr>
+              <a:t>YES-11%          NO-89%</a:t>
+            </a:r>
+          </a:p>
+          <a:p>
+            <a:r>
+              <a:rPr lang="en-IN" sz="1200" kern="1200" dirty="0" smtClean="0">
+                <a:solidFill>
+                  <a:schemeClr val="tx1"/>
+                </a:solidFill>
+                <a:effectLst/>
+                <a:latin typeface="+mn-lt"/>
+                <a:ea typeface="+mn-ea"/>
+                <a:cs typeface="+mn-cs"/>
+              </a:rPr>
+              <a:t>4. How GUI's are important as customer point of view?</a:t>
+            </a:r>
+          </a:p>
+          <a:p>
+            <a:r>
+              <a:rPr lang="en-IN" sz="1200" kern="1200" dirty="0" smtClean="0">
+                <a:solidFill>
+                  <a:schemeClr val="tx1"/>
+                </a:solidFill>
+                <a:effectLst/>
+                <a:latin typeface="+mn-lt"/>
+                <a:ea typeface="+mn-ea"/>
+                <a:cs typeface="+mn-cs"/>
+              </a:rPr>
+              <a:t>YES-100%           NO-0%</a:t>
+            </a:r>
+          </a:p>
+          <a:p>
+            <a:r>
+              <a:rPr lang="en-IN" sz="1200" kern="1200" dirty="0" smtClean="0">
+                <a:solidFill>
+                  <a:schemeClr val="tx1"/>
+                </a:solidFill>
+                <a:effectLst/>
+                <a:latin typeface="+mn-lt"/>
+                <a:ea typeface="+mn-ea"/>
+                <a:cs typeface="+mn-cs"/>
+              </a:rPr>
+              <a:t>5. Process of checkout is safe or not. How important is safe transaction in middle of process</a:t>
+            </a:r>
+          </a:p>
+          <a:p>
+            <a:r>
+              <a:rPr lang="en-IN" sz="1200" kern="1200" dirty="0" smtClean="0">
+                <a:solidFill>
+                  <a:schemeClr val="tx1"/>
+                </a:solidFill>
+                <a:effectLst/>
+                <a:latin typeface="+mn-lt"/>
+                <a:ea typeface="+mn-ea"/>
+                <a:cs typeface="+mn-cs"/>
+              </a:rPr>
+              <a:t>SAFE -80%         NOT SAFE-20%</a:t>
+            </a:r>
+          </a:p>
+          <a:p>
+            <a:r>
+              <a:rPr lang="en-IN" sz="1200" kern="1200" dirty="0" smtClean="0">
+                <a:solidFill>
+                  <a:schemeClr val="tx1"/>
+                </a:solidFill>
+                <a:effectLst/>
+                <a:latin typeface="+mn-lt"/>
+                <a:ea typeface="+mn-ea"/>
+                <a:cs typeface="+mn-cs"/>
+              </a:rPr>
+              <a:t>6. How much importance does a carrier brand (AT&amp;T, T-Mobile etc.) play in your selection of the type of smartphone/tablet?</a:t>
+            </a:r>
+          </a:p>
+          <a:p>
+            <a:r>
+              <a:rPr lang="en-IN" sz="1200" kern="1200" dirty="0" smtClean="0">
+                <a:solidFill>
+                  <a:schemeClr val="tx1"/>
+                </a:solidFill>
+                <a:effectLst/>
+                <a:latin typeface="+mn-lt"/>
+                <a:ea typeface="+mn-ea"/>
+                <a:cs typeface="+mn-cs"/>
+              </a:rPr>
+              <a:t>YES -78%          NO-22%</a:t>
+            </a:r>
+          </a:p>
+          <a:p>
+            <a:r>
+              <a:rPr lang="en-IN" sz="1200" kern="1200" dirty="0" smtClean="0">
+                <a:solidFill>
+                  <a:schemeClr val="tx1"/>
+                </a:solidFill>
+                <a:effectLst/>
+                <a:latin typeface="+mn-lt"/>
+                <a:ea typeface="+mn-ea"/>
+                <a:cs typeface="+mn-cs"/>
+              </a:rPr>
+              <a:t>7. How much interest do you have in the accessories of smartphone/tablet during the smartphone/tablet checkout process? </a:t>
+            </a:r>
+          </a:p>
+          <a:p>
+            <a:r>
+              <a:rPr lang="en-IN" sz="1200" kern="1200" dirty="0" smtClean="0">
+                <a:solidFill>
+                  <a:schemeClr val="tx1"/>
+                </a:solidFill>
+                <a:effectLst/>
+                <a:latin typeface="+mn-lt"/>
+                <a:ea typeface="+mn-ea"/>
+                <a:cs typeface="+mn-cs"/>
+              </a:rPr>
+              <a:t>YES -31%          NO-69%</a:t>
+            </a:r>
+          </a:p>
+          <a:p>
+            <a:r>
+              <a:rPr lang="en-IN" sz="1200" kern="1200" dirty="0" smtClean="0">
+                <a:solidFill>
+                  <a:schemeClr val="tx1"/>
+                </a:solidFill>
+                <a:effectLst/>
+                <a:latin typeface="+mn-lt"/>
+                <a:ea typeface="+mn-ea"/>
+                <a:cs typeface="+mn-cs"/>
+              </a:rPr>
+              <a:t>8-What kind of problem you might face during checkout process?</a:t>
+            </a:r>
+          </a:p>
+          <a:p>
+            <a:r>
+              <a:rPr lang="en-IN" sz="1200" kern="1200" dirty="0" smtClean="0">
+                <a:solidFill>
+                  <a:schemeClr val="tx1"/>
+                </a:solidFill>
+                <a:effectLst/>
+                <a:latin typeface="+mn-lt"/>
+                <a:ea typeface="+mn-ea"/>
+                <a:cs typeface="+mn-cs"/>
+              </a:rPr>
+              <a:t>Unnecessary advertisement</a:t>
+            </a:r>
+          </a:p>
+          <a:p>
+            <a:r>
+              <a:rPr lang="en-IN" sz="1200" kern="1200" dirty="0" smtClean="0">
+                <a:solidFill>
+                  <a:schemeClr val="tx1"/>
+                </a:solidFill>
+                <a:effectLst/>
+                <a:latin typeface="+mn-lt"/>
+                <a:ea typeface="+mn-ea"/>
+                <a:cs typeface="+mn-cs"/>
+              </a:rPr>
+              <a:t>9. On a scale of 1 to 4 (1 being bad, 4 being good)</a:t>
+            </a:r>
+          </a:p>
+          <a:p>
+            <a:r>
+              <a:rPr lang="en-IN" sz="1200" kern="1200" dirty="0" smtClean="0">
+                <a:solidFill>
+                  <a:schemeClr val="tx1"/>
+                </a:solidFill>
+                <a:effectLst/>
+                <a:latin typeface="+mn-lt"/>
+                <a:ea typeface="+mn-ea"/>
+                <a:cs typeface="+mn-cs"/>
+              </a:rPr>
+              <a:t>3(OUT OF 4)</a:t>
+            </a:r>
+            <a:endParaRPr lang="en-IN" dirty="0" smtClean="0"/>
+          </a:p>
+          <a:p>
+            <a:endParaRPr lang="en-IN" dirty="0"/>
+          </a:p>
+        </p:txBody>
+      </p:sp>
+      <p:sp>
+        <p:nvSpPr>
+          <p:cNvPr id="4" name="Slide Number Placeholder 3"/>
+          <p:cNvSpPr>
+            <a:spLocks noGrp="1"/>
+          </p:cNvSpPr>
+          <p:nvPr>
+            <p:ph type="sldNum" sz="quarter" idx="10"/>
+          </p:nvPr>
+        </p:nvSpPr>
+        <p:spPr/>
+        <p:txBody>
+          <a:bodyPr/>
+          <a:lstStyle/>
+          <a:p>
+            <a:fld id="{23A87F7C-8401-485A-BB32-D2822C8B0F75}" type="slidenum">
+              <a:rPr lang="en-US" smtClean="0"/>
+              <a:t>9</a:t>
+            </a:fld>
+            <a:endParaRPr lang="en-US" dirty="0"/>
+          </a:p>
+        </p:txBody>
+      </p:sp>
+    </p:spTree>
+    <p:extLst>
+      <p:ext uri="{BB962C8B-B14F-4D97-AF65-F5344CB8AC3E}">
+        <p14:creationId xmlns:p14="http://schemas.microsoft.com/office/powerpoint/2010/main" val="421701171"/>
       </p:ext>
     </p:extLst>
   </p:cSld>
@@ -735,7 +1734,7 @@
           <a:lstStyle/>
           <a:p>
             <a:pPr algn="ctr"/>
-            <a:endParaRPr lang="en-US"/>
+            <a:endParaRPr lang="en-US" dirty="0"/>
           </a:p>
         </p:txBody>
       </p:sp>
@@ -911,7 +1910,7 @@
               <a:rPr lang="en-US" smtClean="0"/>
               <a:t>4/14/2013</a:t>
             </a:fld>
-            <a:endParaRPr lang="en-US"/>
+            <a:endParaRPr lang="en-US" dirty="0"/>
           </a:p>
         </p:txBody>
       </p:sp>
@@ -930,7 +1929,7 @@
           <a:bodyPr/>
           <a:lstStyle/>
           <a:p>
-            <a:endParaRPr lang="en-US"/>
+            <a:endParaRPr lang="en-US" dirty="0"/>
           </a:p>
         </p:txBody>
       </p:sp>
@@ -953,7 +1952,7 @@
               <a:rPr lang="en-US" smtClean="0"/>
               <a:t>‹#›</a:t>
             </a:fld>
-            <a:endParaRPr lang="en-US"/>
+            <a:endParaRPr lang="en-US" dirty="0"/>
           </a:p>
         </p:txBody>
       </p:sp>
@@ -996,7 +1995,7 @@
           <a:lstStyle/>
           <a:p>
             <a:pPr algn="ctr"/>
-            <a:endParaRPr lang="en-US"/>
+            <a:endParaRPr lang="en-US" dirty="0"/>
           </a:p>
         </p:txBody>
       </p:sp>
@@ -1124,7 +2123,7 @@
               <a:rPr lang="en-US" smtClean="0"/>
               <a:t>4/14/2013</a:t>
             </a:fld>
-            <a:endParaRPr lang="en-US"/>
+            <a:endParaRPr lang="en-US" dirty="0"/>
           </a:p>
         </p:txBody>
       </p:sp>
@@ -1143,7 +2142,7 @@
           <a:bodyPr/>
           <a:lstStyle/>
           <a:p>
-            <a:endParaRPr lang="en-US"/>
+            <a:endParaRPr lang="en-US" dirty="0"/>
           </a:p>
         </p:txBody>
       </p:sp>
@@ -1166,7 +2165,7 @@
               <a:rPr lang="en-US" smtClean="0"/>
               <a:t>‹#›</a:t>
             </a:fld>
-            <a:endParaRPr lang="en-US"/>
+            <a:endParaRPr lang="en-US" dirty="0"/>
           </a:p>
         </p:txBody>
       </p:sp>
@@ -1299,7 +2298,7 @@
               <a:rPr lang="en-US" smtClean="0"/>
               <a:t>4/14/2013</a:t>
             </a:fld>
-            <a:endParaRPr lang="en-US"/>
+            <a:endParaRPr lang="en-US" dirty="0"/>
           </a:p>
         </p:txBody>
       </p:sp>
@@ -1318,7 +2317,7 @@
           <a:bodyPr/>
           <a:lstStyle/>
           <a:p>
-            <a:endParaRPr lang="en-US"/>
+            <a:endParaRPr lang="en-US" dirty="0"/>
           </a:p>
         </p:txBody>
       </p:sp>
@@ -1341,7 +2340,7 @@
               <a:rPr lang="en-US" smtClean="0"/>
               <a:t>‹#›</a:t>
             </a:fld>
-            <a:endParaRPr lang="en-US"/>
+            <a:endParaRPr lang="en-US" dirty="0"/>
           </a:p>
         </p:txBody>
       </p:sp>
@@ -1464,7 +2463,7 @@
               <a:rPr lang="en-US" smtClean="0"/>
               <a:t>4/14/2013</a:t>
             </a:fld>
-            <a:endParaRPr lang="en-US"/>
+            <a:endParaRPr lang="en-US" dirty="0"/>
           </a:p>
         </p:txBody>
       </p:sp>
@@ -1483,7 +2482,7 @@
           <a:bodyPr/>
           <a:lstStyle/>
           <a:p>
-            <a:endParaRPr lang="en-US"/>
+            <a:endParaRPr lang="en-US" dirty="0"/>
           </a:p>
         </p:txBody>
       </p:sp>
@@ -1506,7 +2505,7 @@
               <a:rPr lang="en-US" smtClean="0"/>
               <a:t>‹#›</a:t>
             </a:fld>
-            <a:endParaRPr lang="en-US"/>
+            <a:endParaRPr lang="en-US" dirty="0"/>
           </a:p>
         </p:txBody>
       </p:sp>
@@ -1574,7 +2573,7 @@
           <a:lstStyle/>
           <a:p>
             <a:pPr algn="ctr"/>
-            <a:endParaRPr lang="en-US"/>
+            <a:endParaRPr lang="en-US" dirty="0"/>
           </a:p>
         </p:txBody>
       </p:sp>
@@ -1748,7 +2747,7 @@
               <a:rPr lang="en-US" smtClean="0"/>
               <a:t>4/14/2013</a:t>
             </a:fld>
-            <a:endParaRPr lang="en-US"/>
+            <a:endParaRPr lang="en-US" dirty="0"/>
           </a:p>
         </p:txBody>
       </p:sp>
@@ -1767,7 +2766,7 @@
           <a:bodyPr/>
           <a:lstStyle/>
           <a:p>
-            <a:endParaRPr lang="en-US"/>
+            <a:endParaRPr lang="en-US" dirty="0"/>
           </a:p>
         </p:txBody>
       </p:sp>
@@ -1790,7 +2789,7 @@
               <a:rPr lang="en-US" smtClean="0"/>
               <a:t>‹#›</a:t>
             </a:fld>
-            <a:endParaRPr lang="en-US"/>
+            <a:endParaRPr lang="en-US" dirty="0"/>
           </a:p>
         </p:txBody>
       </p:sp>
@@ -1833,7 +2832,7 @@
           <a:lstStyle/>
           <a:p>
             <a:pPr algn="ctr"/>
-            <a:endParaRPr lang="en-US"/>
+            <a:endParaRPr lang="en-US" dirty="0"/>
           </a:p>
         </p:txBody>
       </p:sp>
@@ -2074,7 +3073,7 @@
               <a:rPr lang="en-US" smtClean="0"/>
               <a:t>4/14/2013</a:t>
             </a:fld>
-            <a:endParaRPr lang="en-US"/>
+            <a:endParaRPr lang="en-US" dirty="0"/>
           </a:p>
         </p:txBody>
       </p:sp>
@@ -2093,7 +3092,7 @@
           <a:bodyPr/>
           <a:lstStyle/>
           <a:p>
-            <a:endParaRPr lang="en-US"/>
+            <a:endParaRPr lang="en-US" dirty="0"/>
           </a:p>
         </p:txBody>
       </p:sp>
@@ -2116,7 +3115,7 @@
               <a:rPr lang="en-US" smtClean="0"/>
               <a:t>‹#›</a:t>
             </a:fld>
-            <a:endParaRPr lang="en-US"/>
+            <a:endParaRPr lang="en-US" dirty="0"/>
           </a:p>
         </p:txBody>
       </p:sp>
@@ -2499,7 +3498,7 @@
               <a:rPr lang="en-US" smtClean="0"/>
               <a:t>4/14/2013</a:t>
             </a:fld>
-            <a:endParaRPr lang="en-US"/>
+            <a:endParaRPr lang="en-US" dirty="0"/>
           </a:p>
         </p:txBody>
       </p:sp>
@@ -2518,7 +3517,7 @@
           <a:bodyPr/>
           <a:lstStyle/>
           <a:p>
-            <a:endParaRPr lang="en-US"/>
+            <a:endParaRPr lang="en-US" dirty="0"/>
           </a:p>
         </p:txBody>
       </p:sp>
@@ -2541,7 +3540,7 @@
               <a:rPr lang="en-US" smtClean="0"/>
               <a:t>‹#›</a:t>
             </a:fld>
-            <a:endParaRPr lang="en-US"/>
+            <a:endParaRPr lang="en-US" dirty="0"/>
           </a:p>
         </p:txBody>
       </p:sp>
@@ -2672,7 +3671,7 @@
               <a:rPr lang="en-US" smtClean="0"/>
               <a:t>4/14/2013</a:t>
             </a:fld>
-            <a:endParaRPr lang="en-US"/>
+            <a:endParaRPr lang="en-US" dirty="0"/>
           </a:p>
         </p:txBody>
       </p:sp>
@@ -2691,7 +3690,7 @@
           <a:bodyPr/>
           <a:lstStyle/>
           <a:p>
-            <a:endParaRPr lang="en-US"/>
+            <a:endParaRPr lang="en-US" dirty="0"/>
           </a:p>
         </p:txBody>
       </p:sp>
@@ -2714,7 +3713,7 @@
               <a:rPr lang="en-US" smtClean="0"/>
               <a:t>‹#›</a:t>
             </a:fld>
-            <a:endParaRPr lang="en-US"/>
+            <a:endParaRPr lang="en-US" dirty="0"/>
           </a:p>
         </p:txBody>
       </p:sp>
@@ -2762,7 +3761,7 @@
               <a:rPr lang="en-US" smtClean="0"/>
               <a:t>4/14/2013</a:t>
             </a:fld>
-            <a:endParaRPr lang="en-US"/>
+            <a:endParaRPr lang="en-US" dirty="0"/>
           </a:p>
         </p:txBody>
       </p:sp>
@@ -2781,7 +3780,7 @@
           <a:bodyPr/>
           <a:lstStyle/>
           <a:p>
-            <a:endParaRPr lang="en-US"/>
+            <a:endParaRPr lang="en-US" dirty="0"/>
           </a:p>
         </p:txBody>
       </p:sp>
@@ -2804,7 +3803,7 @@
               <a:rPr lang="en-US" smtClean="0"/>
               <a:t>‹#›</a:t>
             </a:fld>
-            <a:endParaRPr lang="en-US"/>
+            <a:endParaRPr lang="en-US" dirty="0"/>
           </a:p>
         </p:txBody>
       </p:sp>
@@ -3042,7 +4041,7 @@
               <a:rPr lang="en-US" smtClean="0"/>
               <a:t>4/14/2013</a:t>
             </a:fld>
-            <a:endParaRPr lang="en-US"/>
+            <a:endParaRPr lang="en-US" dirty="0"/>
           </a:p>
         </p:txBody>
       </p:sp>
@@ -3061,7 +4060,7 @@
           <a:bodyPr/>
           <a:lstStyle/>
           <a:p>
-            <a:endParaRPr lang="en-US"/>
+            <a:endParaRPr lang="en-US" dirty="0"/>
           </a:p>
         </p:txBody>
       </p:sp>
@@ -3084,7 +4083,7 @@
               <a:rPr lang="en-US" smtClean="0"/>
               <a:t>‹#›</a:t>
             </a:fld>
-            <a:endParaRPr lang="en-US"/>
+            <a:endParaRPr lang="en-US" dirty="0"/>
           </a:p>
         </p:txBody>
       </p:sp>
@@ -3248,10 +4247,10 @@
           </a:lstStyle>
           <a:p>
             <a:r>
-              <a:rPr lang="en-US" smtClean="0"/>
+              <a:rPr lang="en-US" dirty="0" smtClean="0"/>
               <a:t>Click icon to add picture</a:t>
             </a:r>
-            <a:endParaRPr lang="en-US"/>
+            <a:endParaRPr lang="en-US" dirty="0"/>
           </a:p>
         </p:txBody>
       </p:sp>
@@ -3341,7 +4340,7 @@
               <a:rPr lang="en-US" smtClean="0"/>
               <a:t>4/14/2013</a:t>
             </a:fld>
-            <a:endParaRPr lang="en-US"/>
+            <a:endParaRPr lang="en-US" dirty="0"/>
           </a:p>
         </p:txBody>
       </p:sp>
@@ -3360,7 +4359,7 @@
           <a:bodyPr/>
           <a:lstStyle/>
           <a:p>
-            <a:endParaRPr lang="en-US"/>
+            <a:endParaRPr lang="en-US" dirty="0"/>
           </a:p>
         </p:txBody>
       </p:sp>
@@ -3383,7 +4382,7 @@
               <a:rPr lang="en-US" smtClean="0"/>
               <a:t>‹#›</a:t>
             </a:fld>
-            <a:endParaRPr lang="en-US"/>
+            <a:endParaRPr lang="en-US" dirty="0"/>
           </a:p>
         </p:txBody>
       </p:sp>
@@ -3551,7 +4550,7 @@
               <a:rPr lang="en-US" smtClean="0"/>
               <a:t>4/14/2013</a:t>
             </a:fld>
-            <a:endParaRPr lang="en-US"/>
+            <a:endParaRPr lang="en-US" dirty="0"/>
           </a:p>
         </p:txBody>
       </p:sp>
@@ -3589,7 +4588,7 @@
             </a:lvl1pPr>
           </a:lstStyle>
           <a:p>
-            <a:endParaRPr lang="en-US"/>
+            <a:endParaRPr lang="en-US" dirty="0"/>
           </a:p>
         </p:txBody>
       </p:sp>
@@ -3632,7 +4631,7 @@
               <a:rPr lang="en-US" smtClean="0"/>
               <a:t>‹#›</a:t>
             </a:fld>
-            <a:endParaRPr lang="en-US"/>
+            <a:endParaRPr lang="en-US" dirty="0"/>
           </a:p>
         </p:txBody>
       </p:sp>
@@ -3675,7 +4674,7 @@
           <a:lstStyle/>
           <a:p>
             <a:pPr algn="ctr"/>
-            <a:endParaRPr lang="en-US"/>
+            <a:endParaRPr lang="en-US" dirty="0"/>
           </a:p>
         </p:txBody>
       </p:sp>
@@ -3718,7 +4717,7 @@
           <a:lstStyle/>
           <a:p>
             <a:pPr algn="ctr"/>
-            <a:endParaRPr lang="en-US"/>
+            <a:endParaRPr lang="en-US" dirty="0"/>
           </a:p>
         </p:txBody>
       </p:sp>
@@ -4136,37 +5135,8 @@
           <a:p>
             <a:r>
               <a:rPr lang="en-US" dirty="0" smtClean="0"/>
-              <a:t>Lance Burgo, </a:t>
-            </a:r>
-            <a:r>
-              <a:rPr lang="en-US" dirty="0" err="1" smtClean="0"/>
-              <a:t>Ji</a:t>
-            </a:r>
-            <a:r>
-              <a:rPr lang="en-US" dirty="0" smtClean="0"/>
-              <a:t> </a:t>
-            </a:r>
-            <a:r>
-              <a:rPr lang="en-US" dirty="0" err="1" smtClean="0"/>
-              <a:t>Gu</a:t>
-            </a:r>
-            <a:r>
-              <a:rPr lang="en-US" dirty="0" smtClean="0"/>
-              <a:t>, </a:t>
-            </a:r>
-            <a:r>
-              <a:rPr lang="en-US" dirty="0" err="1" smtClean="0"/>
-              <a:t>Shobhit</a:t>
-            </a:r>
-            <a:r>
-              <a:rPr lang="en-US" dirty="0" smtClean="0"/>
-              <a:t> </a:t>
-            </a:r>
-            <a:r>
-              <a:rPr lang="en-US" dirty="0" err="1" smtClean="0"/>
-              <a:t>Jaiswal</a:t>
-            </a:r>
-            <a:endParaRPr lang="en-US" dirty="0" smtClean="0"/>
+              <a:t>Lance Burgo, Ji Gu, Shobhit Jaiswal</a:t>
+            </a:r>
           </a:p>
           <a:p>
             <a:pPr algn="r"/>
@@ -4302,15 +5272,7 @@
             <a:pPr lvl="0"/>
             <a:r>
               <a:rPr lang="en-US" dirty="0" smtClean="0"/>
-              <a:t>Final </a:t>
-            </a:r>
-            <a:r>
-              <a:rPr lang="en-US" dirty="0" smtClean="0"/>
-              <a:t>product </a:t>
-            </a:r>
-            <a:r>
-              <a:rPr lang="en-US" dirty="0" smtClean="0"/>
-              <a:t>can be found here: </a:t>
+              <a:t>Final product can be found here: </a:t>
             </a:r>
             <a:r>
               <a:rPr lang="en-US" dirty="0">
@@ -4472,6 +5434,12 @@
             </a:r>
           </a:p>
           <a:p>
+            <a:r>
+              <a:rPr lang="en-US" dirty="0" smtClean="0"/>
+              <a:t>Sign-in functionality to register users</a:t>
+            </a:r>
+          </a:p>
+          <a:p>
             <a:pPr lvl="1"/>
             <a:endParaRPr lang="en-US" dirty="0"/>
           </a:p>
@@ -4487,6 +5455,13 @@
   <p:clrMapOvr>
     <a:masterClrMapping/>
   </p:clrMapOvr>
+  <p:timing>
+    <p:tnLst>
+      <p:par>
+        <p:cTn id="1" dur="indefinite" restart="never" nodeType="tmRoot"/>
+      </p:par>
+    </p:tnLst>
+  </p:timing>
 </p:sld>
 </file>
 
@@ -4992,11 +5967,7 @@
             </a:pPr>
             <a:r>
               <a:rPr lang="en-US" b="1" dirty="0" smtClean="0"/>
-              <a:t>Marketing Manager, age </a:t>
-            </a:r>
-            <a:r>
-              <a:rPr lang="en-US" b="1" dirty="0" smtClean="0"/>
-              <a:t>48</a:t>
+              <a:t>Marketing Manager, age 48</a:t>
             </a:r>
           </a:p>
           <a:p>
@@ -5091,7 +6062,7 @@
           <p:nvPr/>
         </p:nvPicPr>
         <p:blipFill>
-          <a:blip r:embed="rId2">
+          <a:blip r:embed="rId3">
             <a:extLst>
               <a:ext uri="{28A0092B-C50C-407E-A947-70E740481C1C}">
                 <a14:useLocalDpi xmlns:a14="http://schemas.microsoft.com/office/drawing/2010/main" val="0"/>
@@ -5124,7 +6095,7 @@
           <p:nvPr/>
         </p:nvPicPr>
         <p:blipFill>
-          <a:blip r:embed="rId3" cstate="print">
+          <a:blip r:embed="rId4" cstate="print">
             <a:extLst>
               <a:ext uri="{28A0092B-C50C-407E-A947-70E740481C1C}">
                 <a14:useLocalDpi xmlns:a14="http://schemas.microsoft.com/office/drawing/2010/main" val="0"/>
@@ -5264,7 +6235,7 @@
         <p:spPr/>
         <p:txBody>
           <a:bodyPr>
-            <a:normAutofit fontScale="92500"/>
+            <a:normAutofit fontScale="92500" lnSpcReduction="10000"/>
           </a:bodyPr>
           <a:lstStyle/>
           <a:p>
@@ -5359,8 +6330,20 @@
             </a:r>
             <a:r>
               <a:rPr lang="en-US" sz="2000" dirty="0"/>
-              <a:t>forms (move through with the tab key, press enter to submit)</a:t>
-            </a:r>
+              <a:t>forms (move through with the tab key, press enter to submit</a:t>
+            </a:r>
+            <a:r>
+              <a:rPr lang="en-US" sz="2000" dirty="0" smtClean="0"/>
+              <a:t>)</a:t>
+            </a:r>
+          </a:p>
+          <a:p>
+            <a:pPr lvl="1" hangingPunct="0"/>
+            <a:r>
+              <a:rPr lang="en-US" sz="2000" dirty="0" smtClean="0"/>
+              <a:t>Leverage HTML5 technologies to create error-free, simple design</a:t>
+            </a:r>
+            <a:endParaRPr lang="en-US" sz="2000" dirty="0"/>
           </a:p>
           <a:p>
             <a:endParaRPr lang="en-US" dirty="0"/>
@@ -5632,25 +6615,141 @@
             <p:ph idx="1"/>
           </p:nvPr>
         </p:nvSpPr>
-        <p:spPr/>
-        <p:txBody>
-          <a:bodyPr/>
-          <a:lstStyle/>
-          <a:p>
-            <a:endParaRPr lang="en-US"/>
-          </a:p>
-        </p:txBody>
-      </p:sp>
+        <p:spPr>
+          <a:xfrm>
+            <a:off x="762000" y="685800"/>
+            <a:ext cx="4343400" cy="3886200"/>
+          </a:xfrm>
+        </p:spPr>
+        <p:txBody>
+          <a:bodyPr>
+            <a:normAutofit lnSpcReduction="10000"/>
+          </a:bodyPr>
+          <a:lstStyle/>
+          <a:p>
+            <a:r>
+              <a:rPr lang="en-US" dirty="0" smtClean="0"/>
+              <a:t>Initial design utilized HTML5 notifications, which had 2 problems</a:t>
+            </a:r>
+          </a:p>
+          <a:p>
+            <a:pPr lvl="1"/>
+            <a:r>
+              <a:rPr lang="en-US" dirty="0" smtClean="0"/>
+              <a:t>No informative error messages (except for email)</a:t>
+            </a:r>
+          </a:p>
+          <a:p>
+            <a:pPr lvl="1"/>
+            <a:r>
+              <a:rPr lang="en-US" dirty="0" smtClean="0"/>
+              <a:t>No validation of fields (except for email)</a:t>
+            </a:r>
+          </a:p>
+          <a:p>
+            <a:pPr lvl="1"/>
+            <a:r>
+              <a:rPr lang="en-US" dirty="0" smtClean="0"/>
+              <a:t>No enforcement of required drop-downs</a:t>
+            </a:r>
+          </a:p>
+          <a:p>
+            <a:r>
+              <a:rPr lang="en-US" dirty="0" smtClean="0"/>
+              <a:t>Issues with auto-fill (</a:t>
+            </a:r>
+            <a:r>
+              <a:rPr lang="en-US" dirty="0" smtClean="0"/>
+              <a:t>automatic </a:t>
+            </a:r>
+            <a:r>
+              <a:rPr lang="en-US" dirty="0" smtClean="0"/>
+              <a:t>copy of redundant information)</a:t>
+            </a:r>
+          </a:p>
+        </p:txBody>
+      </p:sp>
+      <p:pic>
+        <p:nvPicPr>
+          <p:cNvPr id="4" name="Picture 3"/>
+          <p:cNvPicPr>
+            <a:picLocks noChangeAspect="1" noChangeArrowheads="1"/>
+          </p:cNvPicPr>
+          <p:nvPr/>
+        </p:nvPicPr>
+        <p:blipFill>
+          <a:blip r:embed="rId2">
+            <a:extLst>
+              <a:ext uri="{28A0092B-C50C-407E-A947-70E740481C1C}">
+                <a14:useLocalDpi xmlns:a14="http://schemas.microsoft.com/office/drawing/2010/main" val="0"/>
+              </a:ext>
+            </a:extLst>
+          </a:blip>
+          <a:srcRect/>
+          <a:stretch>
+            <a:fillRect/>
+          </a:stretch>
+        </p:blipFill>
+        <p:spPr bwMode="auto">
+          <a:xfrm>
+            <a:off x="5105400" y="1219200"/>
+            <a:ext cx="3408661" cy="2781300"/>
+          </a:xfrm>
+          <a:prstGeom prst="rect">
+            <a:avLst/>
+          </a:prstGeom>
+          <a:noFill/>
+          <a:ln>
+            <a:noFill/>
+          </a:ln>
+          <a:effectLst/>
+          <a:extLst>
+            <a:ext uri="{909E8E84-426E-40DD-AFC4-6F175D3DCCD1}">
+              <a14:hiddenFill xmlns:a14="http://schemas.microsoft.com/office/drawing/2010/main">
+                <a:solidFill>
+                  <a:schemeClr val="accent1"/>
+                </a:solidFill>
+              </a14:hiddenFill>
+            </a:ext>
+            <a:ext uri="{91240B29-F687-4F45-9708-019B960494DF}">
+              <a14:hiddenLine xmlns:a14="http://schemas.microsoft.com/office/drawing/2010/main" w="9525">
+                <a:solidFill>
+                  <a:schemeClr val="tx1"/>
+                </a:solidFill>
+                <a:miter lim="800000"/>
+                <a:headEnd/>
+                <a:tailEnd/>
+              </a14:hiddenLine>
+            </a:ext>
+            <a:ext uri="{AF507438-7753-43E0-B8FC-AC1667EBCBE1}">
+              <a14:hiddenEffects xmlns:a14="http://schemas.microsoft.com/office/drawing/2010/main">
+                <a:effectLst>
+                  <a:outerShdw dist="35921" dir="2700000" algn="ctr" rotWithShape="0">
+                    <a:schemeClr val="bg2"/>
+                  </a:outerShdw>
+                </a:effectLst>
+              </a14:hiddenEffects>
+            </a:ext>
+          </a:extLst>
+        </p:spPr>
+      </p:pic>
     </p:spTree>
     <p:extLst>
       <p:ext uri="{BB962C8B-B14F-4D97-AF65-F5344CB8AC3E}">
-        <p14:creationId xmlns:p14="http://schemas.microsoft.com/office/powerpoint/2010/main" val="3174333444"/>
+        <p14:creationId xmlns:p14="http://schemas.microsoft.com/office/powerpoint/2010/main" val="3916740131"/>
       </p:ext>
     </p:extLst>
   </p:cSld>
   <p:clrMapOvr>
     <a:masterClrMapping/>
   </p:clrMapOvr>
+  <p:timing>
+    <p:tnLst>
+      <p:par>
+        <p:cTn id="1" dur="indefinite" restart="never" nodeType="tmRoot"/>
+      </p:par>
+    </p:tnLst>
+  </p:timing>
 </p:sld>
 </file>
 
@@ -5706,10 +6805,71 @@
         </p:nvSpPr>
         <p:spPr/>
         <p:txBody>
-          <a:bodyPr/>
-          <a:lstStyle/>
-          <a:p>
-            <a:endParaRPr lang="en-US"/>
+          <a:bodyPr>
+            <a:normAutofit/>
+          </a:bodyPr>
+          <a:lstStyle/>
+          <a:p>
+            <a:r>
+              <a:rPr lang="en-US" sz="2000" dirty="0" smtClean="0"/>
+              <a:t>Data collected through online surveys and interviews conducted by the team</a:t>
+            </a:r>
+          </a:p>
+          <a:p>
+            <a:r>
+              <a:rPr lang="en-US" sz="2000" dirty="0" smtClean="0"/>
+              <a:t>Sample size included 23 individuals within our target demographic</a:t>
+            </a:r>
+            <a:endParaRPr lang="en-US" sz="2000" dirty="0"/>
+          </a:p>
+          <a:p>
+            <a:r>
+              <a:rPr lang="en-US" sz="2000" dirty="0" smtClean="0"/>
+              <a:t>User priorities at checkout</a:t>
+            </a:r>
+          </a:p>
+          <a:p>
+            <a:pPr lvl="1"/>
+            <a:r>
+              <a:rPr lang="en-US" sz="1800" dirty="0" smtClean="0"/>
+              <a:t>Smooth, simple user interface</a:t>
+            </a:r>
+          </a:p>
+          <a:p>
+            <a:pPr lvl="1"/>
+            <a:r>
+              <a:rPr lang="en-US" sz="1800" dirty="0" smtClean="0"/>
+              <a:t>Security</a:t>
+            </a:r>
+            <a:endParaRPr lang="en-US" sz="1800" dirty="0"/>
+          </a:p>
+          <a:p>
+            <a:r>
+              <a:rPr lang="en-US" sz="2000" dirty="0" smtClean="0"/>
+              <a:t>User concerns</a:t>
+            </a:r>
+          </a:p>
+          <a:p>
+            <a:pPr lvl="1"/>
+            <a:r>
+              <a:rPr lang="en-US" sz="1800" dirty="0" smtClean="0"/>
+              <a:t>Auto-fill for billing information</a:t>
+            </a:r>
+          </a:p>
+          <a:p>
+            <a:pPr lvl="1"/>
+            <a:r>
+              <a:rPr lang="en-US" sz="1800" dirty="0" smtClean="0"/>
+              <a:t>Character limitations in form fields</a:t>
+            </a:r>
+          </a:p>
+          <a:p>
+            <a:pPr lvl="1"/>
+            <a:endParaRPr lang="en-US" sz="1800" dirty="0" smtClean="0"/>
+          </a:p>
+          <a:p>
+            <a:pPr lvl="1"/>
+            <a:endParaRPr lang="en-US" sz="1800" dirty="0" smtClean="0"/>
           </a:p>
         </p:txBody>
       </p:sp>
@@ -5723,6 +6883,13 @@
   <p:clrMapOvr>
     <a:masterClrMapping/>
   </p:clrMapOvr>
+  <p:timing>
+    <p:tnLst>
+      <p:par>
+        <p:cTn id="1" dur="indefinite" restart="never" nodeType="tmRoot"/>
+      </p:par>
+    </p:tnLst>
+  </p:timing>
 </p:sld>
 </file>
 

</xml_diff>